<commit_message>
Upgrade to golang 1.13
</commit_message>
<xml_diff>
--- a/设计图.pptx
+++ b/设计图.pptx
@@ -278,7 +278,7 @@
           <a:p>
             <a:fld id="{DCF5B490-EC53-4970-A7CC-6E0AB35949B8}" type="datetimeFigureOut">
               <a:rPr lang="zh-CN" altLang="en-US" smtClean="0"/>
-              <a:t>2019/10/21</a:t>
+              <a:t>2020/3/2</a:t>
             </a:fld>
             <a:endParaRPr lang="zh-CN" altLang="en-US"/>
           </a:p>
@@ -476,7 +476,7 @@
           <a:p>
             <a:fld id="{DCF5B490-EC53-4970-A7CC-6E0AB35949B8}" type="datetimeFigureOut">
               <a:rPr lang="zh-CN" altLang="en-US" smtClean="0"/>
-              <a:t>2019/10/21</a:t>
+              <a:t>2020/3/2</a:t>
             </a:fld>
             <a:endParaRPr lang="zh-CN" altLang="en-US"/>
           </a:p>
@@ -684,7 +684,7 @@
           <a:p>
             <a:fld id="{DCF5B490-EC53-4970-A7CC-6E0AB35949B8}" type="datetimeFigureOut">
               <a:rPr lang="zh-CN" altLang="en-US" smtClean="0"/>
-              <a:t>2019/10/21</a:t>
+              <a:t>2020/3/2</a:t>
             </a:fld>
             <a:endParaRPr lang="zh-CN" altLang="en-US"/>
           </a:p>
@@ -882,7 +882,7 @@
           <a:p>
             <a:fld id="{DCF5B490-EC53-4970-A7CC-6E0AB35949B8}" type="datetimeFigureOut">
               <a:rPr lang="zh-CN" altLang="en-US" smtClean="0"/>
-              <a:t>2019/10/21</a:t>
+              <a:t>2020/3/2</a:t>
             </a:fld>
             <a:endParaRPr lang="zh-CN" altLang="en-US"/>
           </a:p>
@@ -1157,7 +1157,7 @@
           <a:p>
             <a:fld id="{DCF5B490-EC53-4970-A7CC-6E0AB35949B8}" type="datetimeFigureOut">
               <a:rPr lang="zh-CN" altLang="en-US" smtClean="0"/>
-              <a:t>2019/10/21</a:t>
+              <a:t>2020/3/2</a:t>
             </a:fld>
             <a:endParaRPr lang="zh-CN" altLang="en-US"/>
           </a:p>
@@ -1422,7 +1422,7 @@
           <a:p>
             <a:fld id="{DCF5B490-EC53-4970-A7CC-6E0AB35949B8}" type="datetimeFigureOut">
               <a:rPr lang="zh-CN" altLang="en-US" smtClean="0"/>
-              <a:t>2019/10/21</a:t>
+              <a:t>2020/3/2</a:t>
             </a:fld>
             <a:endParaRPr lang="zh-CN" altLang="en-US"/>
           </a:p>
@@ -1834,7 +1834,7 @@
           <a:p>
             <a:fld id="{DCF5B490-EC53-4970-A7CC-6E0AB35949B8}" type="datetimeFigureOut">
               <a:rPr lang="zh-CN" altLang="en-US" smtClean="0"/>
-              <a:t>2019/10/21</a:t>
+              <a:t>2020/3/2</a:t>
             </a:fld>
             <a:endParaRPr lang="zh-CN" altLang="en-US"/>
           </a:p>
@@ -1975,7 +1975,7 @@
           <a:p>
             <a:fld id="{DCF5B490-EC53-4970-A7CC-6E0AB35949B8}" type="datetimeFigureOut">
               <a:rPr lang="zh-CN" altLang="en-US" smtClean="0"/>
-              <a:t>2019/10/21</a:t>
+              <a:t>2020/3/2</a:t>
             </a:fld>
             <a:endParaRPr lang="zh-CN" altLang="en-US"/>
           </a:p>
@@ -2088,7 +2088,7 @@
           <a:p>
             <a:fld id="{DCF5B490-EC53-4970-A7CC-6E0AB35949B8}" type="datetimeFigureOut">
               <a:rPr lang="zh-CN" altLang="en-US" smtClean="0"/>
-              <a:t>2019/10/21</a:t>
+              <a:t>2020/3/2</a:t>
             </a:fld>
             <a:endParaRPr lang="zh-CN" altLang="en-US"/>
           </a:p>
@@ -2399,7 +2399,7 @@
           <a:p>
             <a:fld id="{DCF5B490-EC53-4970-A7CC-6E0AB35949B8}" type="datetimeFigureOut">
               <a:rPr lang="zh-CN" altLang="en-US" smtClean="0"/>
-              <a:t>2019/10/21</a:t>
+              <a:t>2020/3/2</a:t>
             </a:fld>
             <a:endParaRPr lang="zh-CN" altLang="en-US"/>
           </a:p>
@@ -2687,7 +2687,7 @@
           <a:p>
             <a:fld id="{DCF5B490-EC53-4970-A7CC-6E0AB35949B8}" type="datetimeFigureOut">
               <a:rPr lang="zh-CN" altLang="en-US" smtClean="0"/>
-              <a:t>2019/10/21</a:t>
+              <a:t>2020/3/2</a:t>
             </a:fld>
             <a:endParaRPr lang="zh-CN" altLang="en-US"/>
           </a:p>
@@ -2928,7 +2928,7 @@
           <a:p>
             <a:fld id="{DCF5B490-EC53-4970-A7CC-6E0AB35949B8}" type="datetimeFigureOut">
               <a:rPr lang="zh-CN" altLang="en-US" smtClean="0"/>
-              <a:t>2019/10/21</a:t>
+              <a:t>2020/3/2</a:t>
             </a:fld>
             <a:endParaRPr lang="zh-CN" altLang="en-US"/>
           </a:p>
@@ -3368,7 +3368,7 @@
           <a:p>
             <a:r>
               <a:rPr lang="zh-CN" altLang="en-US" dirty="0"/>
-              <a:t>压力测试服务单元</a:t>
+              <a:t>测试服务单元</a:t>
             </a:r>
           </a:p>
         </p:txBody>

</xml_diff>